<commit_message>
list contact with dummy data
</commit_message>
<xml_diff>
--- a/4. Component and Rest Data/Component and Rest Data.pptx
+++ b/4. Component and Rest Data/Component and Rest Data.pptx
@@ -5,7 +5,7 @@
     <p:sldMasterId id="2147483648" r:id="rId1"/>
   </p:sldMasterIdLst>
   <p:notesMasterIdLst>
-    <p:notesMasterId r:id="rId10"/>
+    <p:notesMasterId r:id="rId12"/>
   </p:notesMasterIdLst>
   <p:sldIdLst>
     <p:sldId id="256" r:id="rId2"/>
@@ -16,6 +16,8 @@
     <p:sldId id="264" r:id="rId7"/>
     <p:sldId id="265" r:id="rId8"/>
     <p:sldId id="268" r:id="rId9"/>
+    <p:sldId id="269" r:id="rId10"/>
+    <p:sldId id="270" r:id="rId11"/>
   </p:sldIdLst>
   <p:sldSz cx="12192000" cy="6858000"/>
   <p:notesSz cx="6858000" cy="9144000"/>
@@ -894,6 +896,174 @@
     <p:extLst>
       <p:ext uri="{BB962C8B-B14F-4D97-AF65-F5344CB8AC3E}">
         <p14:creationId xmlns:p14="http://schemas.microsoft.com/office/powerpoint/2010/main" val="4157046575"/>
+      </p:ext>
+    </p:extLst>
+  </p:cSld>
+  <p:clrMapOvr>
+    <a:masterClrMapping/>
+  </p:clrMapOvr>
+</p:notes>
+</file>
+
+<file path=ppt/notesSlides/notesSlide6.xml><?xml version="1.0" encoding="utf-8"?>
+<p:notes xmlns:a="http://schemas.openxmlformats.org/drawingml/2006/main" xmlns:r="http://schemas.openxmlformats.org/officeDocument/2006/relationships" xmlns:p="http://schemas.openxmlformats.org/presentationml/2006/main">
+  <p:cSld>
+    <p:spTree>
+      <p:nvGrpSpPr>
+        <p:cNvPr id="1" name=""/>
+        <p:cNvGrpSpPr/>
+        <p:nvPr/>
+      </p:nvGrpSpPr>
+      <p:grpSpPr>
+        <a:xfrm>
+          <a:off x="0" y="0"/>
+          <a:ext cx="0" cy="0"/>
+          <a:chOff x="0" y="0"/>
+          <a:chExt cx="0" cy="0"/>
+        </a:xfrm>
+      </p:grpSpPr>
+      <p:sp>
+        <p:nvSpPr>
+          <p:cNvPr id="2" name="Slide Image Placeholder 1"/>
+          <p:cNvSpPr>
+            <a:spLocks noGrp="1" noRot="1" noChangeAspect="1"/>
+          </p:cNvSpPr>
+          <p:nvPr>
+            <p:ph type="sldImg"/>
+          </p:nvPr>
+        </p:nvSpPr>
+        <p:spPr/>
+      </p:sp>
+      <p:sp>
+        <p:nvSpPr>
+          <p:cNvPr id="3" name="Notes Placeholder 2"/>
+          <p:cNvSpPr>
+            <a:spLocks noGrp="1"/>
+          </p:cNvSpPr>
+          <p:nvPr>
+            <p:ph type="body" idx="1"/>
+          </p:nvPr>
+        </p:nvSpPr>
+        <p:spPr/>
+        <p:txBody>
+          <a:bodyPr/>
+          <a:lstStyle/>
+          <a:p>
+            <a:endParaRPr lang="en-US" dirty="0"/>
+          </a:p>
+        </p:txBody>
+      </p:sp>
+      <p:sp>
+        <p:nvSpPr>
+          <p:cNvPr id="4" name="Slide Number Placeholder 3"/>
+          <p:cNvSpPr>
+            <a:spLocks noGrp="1"/>
+          </p:cNvSpPr>
+          <p:nvPr>
+            <p:ph type="sldNum" sz="quarter" idx="10"/>
+          </p:nvPr>
+        </p:nvSpPr>
+        <p:spPr/>
+        <p:txBody>
+          <a:bodyPr/>
+          <a:lstStyle/>
+          <a:p>
+            <a:fld id="{FBFDB2CD-4BE4-A34F-8525-4BCDFACD1891}" type="slidenum">
+              <a:rPr lang="en-US" smtClean="0"/>
+              <a:t>9</a:t>
+            </a:fld>
+            <a:endParaRPr lang="en-US"/>
+          </a:p>
+        </p:txBody>
+      </p:sp>
+    </p:spTree>
+    <p:extLst>
+      <p:ext uri="{BB962C8B-B14F-4D97-AF65-F5344CB8AC3E}">
+        <p14:creationId xmlns:p14="http://schemas.microsoft.com/office/powerpoint/2010/main" val="2240454292"/>
+      </p:ext>
+    </p:extLst>
+  </p:cSld>
+  <p:clrMapOvr>
+    <a:masterClrMapping/>
+  </p:clrMapOvr>
+</p:notes>
+</file>
+
+<file path=ppt/notesSlides/notesSlide7.xml><?xml version="1.0" encoding="utf-8"?>
+<p:notes xmlns:a="http://schemas.openxmlformats.org/drawingml/2006/main" xmlns:r="http://schemas.openxmlformats.org/officeDocument/2006/relationships" xmlns:p="http://schemas.openxmlformats.org/presentationml/2006/main">
+  <p:cSld>
+    <p:spTree>
+      <p:nvGrpSpPr>
+        <p:cNvPr id="1" name=""/>
+        <p:cNvGrpSpPr/>
+        <p:nvPr/>
+      </p:nvGrpSpPr>
+      <p:grpSpPr>
+        <a:xfrm>
+          <a:off x="0" y="0"/>
+          <a:ext cx="0" cy="0"/>
+          <a:chOff x="0" y="0"/>
+          <a:chExt cx="0" cy="0"/>
+        </a:xfrm>
+      </p:grpSpPr>
+      <p:sp>
+        <p:nvSpPr>
+          <p:cNvPr id="2" name="Slide Image Placeholder 1"/>
+          <p:cNvSpPr>
+            <a:spLocks noGrp="1" noRot="1" noChangeAspect="1"/>
+          </p:cNvSpPr>
+          <p:nvPr>
+            <p:ph type="sldImg"/>
+          </p:nvPr>
+        </p:nvSpPr>
+        <p:spPr/>
+      </p:sp>
+      <p:sp>
+        <p:nvSpPr>
+          <p:cNvPr id="3" name="Notes Placeholder 2"/>
+          <p:cNvSpPr>
+            <a:spLocks noGrp="1"/>
+          </p:cNvSpPr>
+          <p:nvPr>
+            <p:ph type="body" idx="1"/>
+          </p:nvPr>
+        </p:nvSpPr>
+        <p:spPr/>
+        <p:txBody>
+          <a:bodyPr/>
+          <a:lstStyle/>
+          <a:p>
+            <a:endParaRPr lang="en-US" dirty="0"/>
+          </a:p>
+        </p:txBody>
+      </p:sp>
+      <p:sp>
+        <p:nvSpPr>
+          <p:cNvPr id="4" name="Slide Number Placeholder 3"/>
+          <p:cNvSpPr>
+            <a:spLocks noGrp="1"/>
+          </p:cNvSpPr>
+          <p:nvPr>
+            <p:ph type="sldNum" sz="quarter" idx="10"/>
+          </p:nvPr>
+        </p:nvSpPr>
+        <p:spPr/>
+        <p:txBody>
+          <a:bodyPr/>
+          <a:lstStyle/>
+          <a:p>
+            <a:fld id="{FBFDB2CD-4BE4-A34F-8525-4BCDFACD1891}" type="slidenum">
+              <a:rPr lang="en-US" smtClean="0"/>
+              <a:t>10</a:t>
+            </a:fld>
+            <a:endParaRPr lang="en-US"/>
+          </a:p>
+        </p:txBody>
+      </p:sp>
+    </p:spTree>
+    <p:extLst>
+      <p:ext uri="{BB962C8B-B14F-4D97-AF65-F5344CB8AC3E}">
+        <p14:creationId xmlns:p14="http://schemas.microsoft.com/office/powerpoint/2010/main" val="2685029624"/>
       </p:ext>
     </p:extLst>
   </p:cSld>
@@ -4416,6 +4586,141 @@
 </p:sld>
 </file>
 
+<file path=ppt/slides/slide10.xml><?xml version="1.0" encoding="utf-8"?>
+<p:sld xmlns:a="http://schemas.openxmlformats.org/drawingml/2006/main" xmlns:r="http://schemas.openxmlformats.org/officeDocument/2006/relationships" xmlns:p="http://schemas.openxmlformats.org/presentationml/2006/main">
+  <p:cSld>
+    <p:spTree>
+      <p:nvGrpSpPr>
+        <p:cNvPr id="1" name=""/>
+        <p:cNvGrpSpPr/>
+        <p:nvPr/>
+      </p:nvGrpSpPr>
+      <p:grpSpPr>
+        <a:xfrm>
+          <a:off x="0" y="0"/>
+          <a:ext cx="0" cy="0"/>
+          <a:chOff x="0" y="0"/>
+          <a:chExt cx="0" cy="0"/>
+        </a:xfrm>
+      </p:grpSpPr>
+      <p:sp>
+        <p:nvSpPr>
+          <p:cNvPr id="2" name="Title 1">
+            <a:extLst>
+              <a:ext uri="{FF2B5EF4-FFF2-40B4-BE49-F238E27FC236}">
+                <a16:creationId xmlns:a16="http://schemas.microsoft.com/office/drawing/2014/main" id="{F8D9D734-5D67-AF4C-AB80-99D18AFC433A}"/>
+              </a:ext>
+            </a:extLst>
+          </p:cNvPr>
+          <p:cNvSpPr>
+            <a:spLocks noGrp="1"/>
+          </p:cNvSpPr>
+          <p:nvPr>
+            <p:ph type="title"/>
+          </p:nvPr>
+        </p:nvSpPr>
+        <p:spPr/>
+        <p:txBody>
+          <a:bodyPr/>
+          <a:lstStyle/>
+          <a:p>
+            <a:r>
+              <a:rPr lang="en-US" dirty="0">
+                <a:latin typeface="Helvetica" pitchFamily="2" charset="0"/>
+                <a:ea typeface="Helvetica Neue Light" panose="02000403000000020004" pitchFamily="2" charset="0"/>
+              </a:rPr>
+              <a:t>Introduction Menu List Contact</a:t>
+            </a:r>
+          </a:p>
+        </p:txBody>
+      </p:sp>
+      <p:sp>
+        <p:nvSpPr>
+          <p:cNvPr id="8" name="TextBox 7">
+            <a:extLst>
+              <a:ext uri="{FF2B5EF4-FFF2-40B4-BE49-F238E27FC236}">
+                <a16:creationId xmlns:a16="http://schemas.microsoft.com/office/drawing/2014/main" id="{DE2665A4-F7EB-F14E-AEEC-99707F031598}"/>
+              </a:ext>
+            </a:extLst>
+          </p:cNvPr>
+          <p:cNvSpPr txBox="1"/>
+          <p:nvPr/>
+        </p:nvSpPr>
+        <p:spPr>
+          <a:xfrm>
+            <a:off x="3968806" y="1425571"/>
+            <a:ext cx="2348720" cy="523220"/>
+          </a:xfrm>
+          <a:prstGeom prst="rect">
+            <a:avLst/>
+          </a:prstGeom>
+          <a:noFill/>
+        </p:spPr>
+        <p:txBody>
+          <a:bodyPr wrap="none" rtlCol="0">
+            <a:spAutoFit/>
+          </a:bodyPr>
+          <a:lstStyle/>
+          <a:p>
+            <a:r>
+              <a:rPr lang="en-US" sz="2800" b="1" dirty="0" err="1">
+                <a:latin typeface="Helvetica Neue" panose="02000503000000020004" pitchFamily="2" charset="0"/>
+                <a:ea typeface="Helvetica Neue" panose="02000503000000020004" pitchFamily="2" charset="0"/>
+                <a:cs typeface="Helvetica Neue" panose="02000503000000020004" pitchFamily="2" charset="0"/>
+              </a:rPr>
+              <a:t>contact.html</a:t>
+            </a:r>
+            <a:endParaRPr lang="en-US" sz="2800" b="1" dirty="0">
+              <a:latin typeface="Helvetica Neue" panose="02000503000000020004" pitchFamily="2" charset="0"/>
+              <a:ea typeface="Helvetica Neue" panose="02000503000000020004" pitchFamily="2" charset="0"/>
+              <a:cs typeface="Helvetica Neue" panose="02000503000000020004" pitchFamily="2" charset="0"/>
+            </a:endParaRPr>
+          </a:p>
+        </p:txBody>
+      </p:sp>
+      <p:pic>
+        <p:nvPicPr>
+          <p:cNvPr id="7" name="Picture 6">
+            <a:extLst>
+              <a:ext uri="{FF2B5EF4-FFF2-40B4-BE49-F238E27FC236}">
+                <a16:creationId xmlns:a16="http://schemas.microsoft.com/office/drawing/2014/main" id="{64CCB785-7594-6148-BCE1-E7CDDFBDE7D4}"/>
+              </a:ext>
+            </a:extLst>
+          </p:cNvPr>
+          <p:cNvPicPr>
+            <a:picLocks noChangeAspect="1"/>
+          </p:cNvPicPr>
+          <p:nvPr/>
+        </p:nvPicPr>
+        <p:blipFill>
+          <a:blip r:embed="rId3"/>
+          <a:stretch>
+            <a:fillRect/>
+          </a:stretch>
+        </p:blipFill>
+        <p:spPr>
+          <a:xfrm>
+            <a:off x="838200" y="1425571"/>
+            <a:ext cx="2818542" cy="5088649"/>
+          </a:xfrm>
+          <a:prstGeom prst="rect">
+            <a:avLst/>
+          </a:prstGeom>
+        </p:spPr>
+      </p:pic>
+    </p:spTree>
+    <p:extLst>
+      <p:ext uri="{BB962C8B-B14F-4D97-AF65-F5344CB8AC3E}">
+        <p14:creationId xmlns:p14="http://schemas.microsoft.com/office/powerpoint/2010/main" val="3255935710"/>
+      </p:ext>
+    </p:extLst>
+  </p:cSld>
+  <p:clrMapOvr>
+    <a:masterClrMapping/>
+  </p:clrMapOvr>
+</p:sld>
+</file>
+
 <file path=ppt/slides/slide2.xml><?xml version="1.0" encoding="utf-8"?>
 <p:sld xmlns:a="http://schemas.openxmlformats.org/drawingml/2006/main" xmlns:r="http://schemas.openxmlformats.org/officeDocument/2006/relationships" xmlns:p="http://schemas.openxmlformats.org/presentationml/2006/main">
   <p:cSld>
@@ -5417,10 +5722,342 @@
           </a:prstGeom>
         </p:spPr>
       </p:pic>
+      <p:pic>
+        <p:nvPicPr>
+          <p:cNvPr id="4" name="Picture 3">
+            <a:extLst>
+              <a:ext uri="{FF2B5EF4-FFF2-40B4-BE49-F238E27FC236}">
+                <a16:creationId xmlns:a16="http://schemas.microsoft.com/office/drawing/2014/main" id="{C1AD29ED-2A74-D042-9A07-2F73AFB2FE1B}"/>
+              </a:ext>
+            </a:extLst>
+          </p:cNvPr>
+          <p:cNvPicPr>
+            <a:picLocks noChangeAspect="1"/>
+          </p:cNvPicPr>
+          <p:nvPr/>
+        </p:nvPicPr>
+        <p:blipFill>
+          <a:blip r:embed="rId4"/>
+          <a:stretch>
+            <a:fillRect/>
+          </a:stretch>
+        </p:blipFill>
+        <p:spPr>
+          <a:xfrm>
+            <a:off x="4589703" y="1439903"/>
+            <a:ext cx="2818542" cy="5088649"/>
+          </a:xfrm>
+          <a:prstGeom prst="rect">
+            <a:avLst/>
+          </a:prstGeom>
+        </p:spPr>
+      </p:pic>
+      <p:pic>
+        <p:nvPicPr>
+          <p:cNvPr id="9" name="Picture 8">
+            <a:extLst>
+              <a:ext uri="{FF2B5EF4-FFF2-40B4-BE49-F238E27FC236}">
+                <a16:creationId xmlns:a16="http://schemas.microsoft.com/office/drawing/2014/main" id="{53EEF767-2C0D-0D44-9403-AAEE2994700E}"/>
+              </a:ext>
+            </a:extLst>
+          </p:cNvPr>
+          <p:cNvPicPr>
+            <a:picLocks noChangeAspect="1"/>
+          </p:cNvPicPr>
+          <p:nvPr/>
+        </p:nvPicPr>
+        <p:blipFill>
+          <a:blip r:embed="rId5"/>
+          <a:stretch>
+            <a:fillRect/>
+          </a:stretch>
+        </p:blipFill>
+        <p:spPr>
+          <a:xfrm>
+            <a:off x="8334630" y="1439903"/>
+            <a:ext cx="2857151" cy="5088649"/>
+          </a:xfrm>
+          <a:prstGeom prst="rect">
+            <a:avLst/>
+          </a:prstGeom>
+        </p:spPr>
+      </p:pic>
+      <p:sp>
+        <p:nvSpPr>
+          <p:cNvPr id="10" name="Right Arrow 9">
+            <a:extLst>
+              <a:ext uri="{FF2B5EF4-FFF2-40B4-BE49-F238E27FC236}">
+                <a16:creationId xmlns:a16="http://schemas.microsoft.com/office/drawing/2014/main" id="{63F780FA-C143-9140-9D45-72A515B75476}"/>
+              </a:ext>
+            </a:extLst>
+          </p:cNvPr>
+          <p:cNvSpPr/>
+          <p:nvPr/>
+        </p:nvSpPr>
+        <p:spPr>
+          <a:xfrm>
+            <a:off x="3416392" y="5042999"/>
+            <a:ext cx="1420238" cy="1186774"/>
+          </a:xfrm>
+          <a:prstGeom prst="rightArrow">
+            <a:avLst/>
+          </a:prstGeom>
+          <a:solidFill>
+            <a:schemeClr val="accent2"/>
+          </a:solidFill>
+          <a:ln>
+            <a:solidFill>
+              <a:schemeClr val="accent2"/>
+            </a:solidFill>
+          </a:ln>
+        </p:spPr>
+        <p:style>
+          <a:lnRef idx="2">
+            <a:schemeClr val="accent1">
+              <a:shade val="50000"/>
+            </a:schemeClr>
+          </a:lnRef>
+          <a:fillRef idx="1">
+            <a:schemeClr val="accent1"/>
+          </a:fillRef>
+          <a:effectRef idx="0">
+            <a:schemeClr val="accent1"/>
+          </a:effectRef>
+          <a:fontRef idx="minor">
+            <a:schemeClr val="lt1"/>
+          </a:fontRef>
+        </p:style>
+        <p:txBody>
+          <a:bodyPr rtlCol="0" anchor="ctr"/>
+          <a:lstStyle/>
+          <a:p>
+            <a:pPr algn="ctr"/>
+            <a:endParaRPr lang="en-US"/>
+          </a:p>
+        </p:txBody>
+      </p:sp>
+      <p:sp>
+        <p:nvSpPr>
+          <p:cNvPr id="11" name="Right Arrow 10">
+            <a:extLst>
+              <a:ext uri="{FF2B5EF4-FFF2-40B4-BE49-F238E27FC236}">
+                <a16:creationId xmlns:a16="http://schemas.microsoft.com/office/drawing/2014/main" id="{643D93D3-96F2-424C-94E4-59E8EE75B4C5}"/>
+              </a:ext>
+            </a:extLst>
+          </p:cNvPr>
+          <p:cNvSpPr/>
+          <p:nvPr/>
+        </p:nvSpPr>
+        <p:spPr>
+          <a:xfrm>
+            <a:off x="7161319" y="5042999"/>
+            <a:ext cx="1420238" cy="1186774"/>
+          </a:xfrm>
+          <a:prstGeom prst="rightArrow">
+            <a:avLst/>
+          </a:prstGeom>
+          <a:solidFill>
+            <a:schemeClr val="accent2"/>
+          </a:solidFill>
+          <a:ln>
+            <a:solidFill>
+              <a:schemeClr val="accent2"/>
+            </a:solidFill>
+          </a:ln>
+        </p:spPr>
+        <p:style>
+          <a:lnRef idx="2">
+            <a:schemeClr val="accent1">
+              <a:shade val="50000"/>
+            </a:schemeClr>
+          </a:lnRef>
+          <a:fillRef idx="1">
+            <a:schemeClr val="accent1"/>
+          </a:fillRef>
+          <a:effectRef idx="0">
+            <a:schemeClr val="accent1"/>
+          </a:effectRef>
+          <a:fontRef idx="minor">
+            <a:schemeClr val="lt1"/>
+          </a:fontRef>
+        </p:style>
+        <p:txBody>
+          <a:bodyPr rtlCol="0" anchor="ctr"/>
+          <a:lstStyle/>
+          <a:p>
+            <a:pPr algn="ctr"/>
+            <a:endParaRPr lang="en-US"/>
+          </a:p>
+        </p:txBody>
+      </p:sp>
     </p:spTree>
     <p:extLst>
       <p:ext uri="{BB962C8B-B14F-4D97-AF65-F5344CB8AC3E}">
         <p14:creationId xmlns:p14="http://schemas.microsoft.com/office/powerpoint/2010/main" val="1198222233"/>
+      </p:ext>
+    </p:extLst>
+  </p:cSld>
+  <p:clrMapOvr>
+    <a:masterClrMapping/>
+  </p:clrMapOvr>
+</p:sld>
+</file>
+
+<file path=ppt/slides/slide9.xml><?xml version="1.0" encoding="utf-8"?>
+<p:sld xmlns:a="http://schemas.openxmlformats.org/drawingml/2006/main" xmlns:r="http://schemas.openxmlformats.org/officeDocument/2006/relationships" xmlns:p="http://schemas.openxmlformats.org/presentationml/2006/main">
+  <p:cSld>
+    <p:spTree>
+      <p:nvGrpSpPr>
+        <p:cNvPr id="1" name=""/>
+        <p:cNvGrpSpPr/>
+        <p:nvPr/>
+      </p:nvGrpSpPr>
+      <p:grpSpPr>
+        <a:xfrm>
+          <a:off x="0" y="0"/>
+          <a:ext cx="0" cy="0"/>
+          <a:chOff x="0" y="0"/>
+          <a:chExt cx="0" cy="0"/>
+        </a:xfrm>
+      </p:grpSpPr>
+      <p:sp>
+        <p:nvSpPr>
+          <p:cNvPr id="2" name="Title 1">
+            <a:extLst>
+              <a:ext uri="{FF2B5EF4-FFF2-40B4-BE49-F238E27FC236}">
+                <a16:creationId xmlns:a16="http://schemas.microsoft.com/office/drawing/2014/main" id="{F8D9D734-5D67-AF4C-AB80-99D18AFC433A}"/>
+              </a:ext>
+            </a:extLst>
+          </p:cNvPr>
+          <p:cNvSpPr>
+            <a:spLocks noGrp="1"/>
+          </p:cNvSpPr>
+          <p:nvPr>
+            <p:ph type="title"/>
+          </p:nvPr>
+        </p:nvSpPr>
+        <p:spPr/>
+        <p:txBody>
+          <a:bodyPr/>
+          <a:lstStyle/>
+          <a:p>
+            <a:r>
+              <a:rPr lang="en-US" dirty="0">
+                <a:latin typeface="Helvetica" pitchFamily="2" charset="0"/>
+                <a:ea typeface="Helvetica Neue Light" panose="02000403000000020004" pitchFamily="2" charset="0"/>
+              </a:rPr>
+              <a:t>Introduction Menu List Contact</a:t>
+            </a:r>
+          </a:p>
+        </p:txBody>
+      </p:sp>
+      <p:pic>
+        <p:nvPicPr>
+          <p:cNvPr id="6" name="Picture 5">
+            <a:extLst>
+              <a:ext uri="{FF2B5EF4-FFF2-40B4-BE49-F238E27FC236}">
+                <a16:creationId xmlns:a16="http://schemas.microsoft.com/office/drawing/2014/main" id="{49440AB1-2B1E-6343-9AB1-46D6540B48F2}"/>
+              </a:ext>
+            </a:extLst>
+          </p:cNvPr>
+          <p:cNvPicPr>
+            <a:picLocks noChangeAspect="1"/>
+          </p:cNvPicPr>
+          <p:nvPr/>
+        </p:nvPicPr>
+        <p:blipFill rotWithShape="1">
+          <a:blip r:embed="rId3"/>
+          <a:srcRect r="50409" b="439"/>
+          <a:stretch/>
+        </p:blipFill>
+        <p:spPr>
+          <a:xfrm>
+            <a:off x="838200" y="1439903"/>
+            <a:ext cx="2825118" cy="5088649"/>
+          </a:xfrm>
+          <a:prstGeom prst="rect">
+            <a:avLst/>
+          </a:prstGeom>
+        </p:spPr>
+      </p:pic>
+      <p:sp>
+        <p:nvSpPr>
+          <p:cNvPr id="8" name="TextBox 7">
+            <a:extLst>
+              <a:ext uri="{FF2B5EF4-FFF2-40B4-BE49-F238E27FC236}">
+                <a16:creationId xmlns:a16="http://schemas.microsoft.com/office/drawing/2014/main" id="{DE2665A4-F7EB-F14E-AEEC-99707F031598}"/>
+              </a:ext>
+            </a:extLst>
+          </p:cNvPr>
+          <p:cNvSpPr txBox="1"/>
+          <p:nvPr/>
+        </p:nvSpPr>
+        <p:spPr>
+          <a:xfrm>
+            <a:off x="3968806" y="1425571"/>
+            <a:ext cx="1909497" cy="523220"/>
+          </a:xfrm>
+          <a:prstGeom prst="rect">
+            <a:avLst/>
+          </a:prstGeom>
+          <a:noFill/>
+        </p:spPr>
+        <p:txBody>
+          <a:bodyPr wrap="none" rtlCol="0">
+            <a:spAutoFit/>
+          </a:bodyPr>
+          <a:lstStyle/>
+          <a:p>
+            <a:r>
+              <a:rPr lang="en-US" sz="2800" b="1" dirty="0" err="1">
+                <a:latin typeface="Helvetica Neue" panose="02000503000000020004" pitchFamily="2" charset="0"/>
+                <a:ea typeface="Helvetica Neue" panose="02000503000000020004" pitchFamily="2" charset="0"/>
+                <a:cs typeface="Helvetica Neue" panose="02000503000000020004" pitchFamily="2" charset="0"/>
+              </a:rPr>
+              <a:t>contact.ts</a:t>
+            </a:r>
+            <a:endParaRPr lang="en-US" sz="2800" b="1" dirty="0">
+              <a:latin typeface="Helvetica Neue" panose="02000503000000020004" pitchFamily="2" charset="0"/>
+              <a:ea typeface="Helvetica Neue" panose="02000503000000020004" pitchFamily="2" charset="0"/>
+              <a:cs typeface="Helvetica Neue" panose="02000503000000020004" pitchFamily="2" charset="0"/>
+            </a:endParaRPr>
+          </a:p>
+        </p:txBody>
+      </p:sp>
+      <p:pic>
+        <p:nvPicPr>
+          <p:cNvPr id="5" name="Picture 4">
+            <a:extLst>
+              <a:ext uri="{FF2B5EF4-FFF2-40B4-BE49-F238E27FC236}">
+                <a16:creationId xmlns:a16="http://schemas.microsoft.com/office/drawing/2014/main" id="{DFE750EB-C1EA-D646-8D0C-1B445131EF16}"/>
+              </a:ext>
+            </a:extLst>
+          </p:cNvPr>
+          <p:cNvPicPr>
+            <a:picLocks noChangeAspect="1"/>
+          </p:cNvPicPr>
+          <p:nvPr/>
+        </p:nvPicPr>
+        <p:blipFill>
+          <a:blip r:embed="rId4"/>
+          <a:stretch>
+            <a:fillRect/>
+          </a:stretch>
+        </p:blipFill>
+        <p:spPr>
+          <a:xfrm>
+            <a:off x="3968806" y="2142727"/>
+            <a:ext cx="4851400" cy="3683000"/>
+          </a:xfrm>
+          <a:prstGeom prst="rect">
+            <a:avLst/>
+          </a:prstGeom>
+        </p:spPr>
+      </p:pic>
+    </p:spTree>
+    <p:extLst>
+      <p:ext uri="{BB962C8B-B14F-4D97-AF65-F5344CB8AC3E}">
+        <p14:creationId xmlns:p14="http://schemas.microsoft.com/office/powerpoint/2010/main" val="2298866466"/>
       </p:ext>
     </p:extLst>
   </p:cSld>

</xml_diff>

<commit_message>
update rest data ppt
</commit_message>
<xml_diff>
--- a/4. Component and Rest Data/Component and Rest Data.pptx
+++ b/4. Component and Rest Data/Component and Rest Data.pptx
@@ -5,7 +5,7 @@
     <p:sldMasterId id="2147483648" r:id="rId1"/>
   </p:sldMasterIdLst>
   <p:notesMasterIdLst>
-    <p:notesMasterId r:id="rId15"/>
+    <p:notesMasterId r:id="rId18"/>
   </p:notesMasterIdLst>
   <p:sldIdLst>
     <p:sldId id="256" r:id="rId2"/>
@@ -21,6 +21,9 @@
     <p:sldId id="270" r:id="rId12"/>
     <p:sldId id="272" r:id="rId13"/>
     <p:sldId id="273" r:id="rId14"/>
+    <p:sldId id="274" r:id="rId15"/>
+    <p:sldId id="275" r:id="rId16"/>
+    <p:sldId id="276" r:id="rId17"/>
   </p:sldIdLst>
   <p:sldSz cx="12192000" cy="6858000"/>
   <p:notesSz cx="6858000" cy="9144000"/>
@@ -647,6 +650,258 @@
     <p:extLst>
       <p:ext uri="{BB962C8B-B14F-4D97-AF65-F5344CB8AC3E}">
         <p14:creationId xmlns:p14="http://schemas.microsoft.com/office/powerpoint/2010/main" val="337360216"/>
+      </p:ext>
+    </p:extLst>
+  </p:cSld>
+  <p:clrMapOvr>
+    <a:masterClrMapping/>
+  </p:clrMapOvr>
+</p:notes>
+</file>
+
+<file path=ppt/notesSlides/notesSlide11.xml><?xml version="1.0" encoding="utf-8"?>
+<p:notes xmlns:a="http://schemas.openxmlformats.org/drawingml/2006/main" xmlns:r="http://schemas.openxmlformats.org/officeDocument/2006/relationships" xmlns:p="http://schemas.openxmlformats.org/presentationml/2006/main">
+  <p:cSld>
+    <p:spTree>
+      <p:nvGrpSpPr>
+        <p:cNvPr id="1" name=""/>
+        <p:cNvGrpSpPr/>
+        <p:nvPr/>
+      </p:nvGrpSpPr>
+      <p:grpSpPr>
+        <a:xfrm>
+          <a:off x="0" y="0"/>
+          <a:ext cx="0" cy="0"/>
+          <a:chOff x="0" y="0"/>
+          <a:chExt cx="0" cy="0"/>
+        </a:xfrm>
+      </p:grpSpPr>
+      <p:sp>
+        <p:nvSpPr>
+          <p:cNvPr id="2" name="Slide Image Placeholder 1"/>
+          <p:cNvSpPr>
+            <a:spLocks noGrp="1" noRot="1" noChangeAspect="1"/>
+          </p:cNvSpPr>
+          <p:nvPr>
+            <p:ph type="sldImg"/>
+          </p:nvPr>
+        </p:nvSpPr>
+        <p:spPr/>
+      </p:sp>
+      <p:sp>
+        <p:nvSpPr>
+          <p:cNvPr id="3" name="Notes Placeholder 2"/>
+          <p:cNvSpPr>
+            <a:spLocks noGrp="1"/>
+          </p:cNvSpPr>
+          <p:nvPr>
+            <p:ph type="body" idx="1"/>
+          </p:nvPr>
+        </p:nvSpPr>
+        <p:spPr/>
+        <p:txBody>
+          <a:bodyPr/>
+          <a:lstStyle/>
+          <a:p>
+            <a:endParaRPr lang="en-US" dirty="0"/>
+          </a:p>
+        </p:txBody>
+      </p:sp>
+      <p:sp>
+        <p:nvSpPr>
+          <p:cNvPr id="4" name="Slide Number Placeholder 3"/>
+          <p:cNvSpPr>
+            <a:spLocks noGrp="1"/>
+          </p:cNvSpPr>
+          <p:nvPr>
+            <p:ph type="sldNum" sz="quarter" idx="10"/>
+          </p:nvPr>
+        </p:nvSpPr>
+        <p:spPr/>
+        <p:txBody>
+          <a:bodyPr/>
+          <a:lstStyle/>
+          <a:p>
+            <a:fld id="{FBFDB2CD-4BE4-A34F-8525-4BCDFACD1891}" type="slidenum">
+              <a:rPr lang="en-US" smtClean="0"/>
+              <a:t>14</a:t>
+            </a:fld>
+            <a:endParaRPr lang="en-US"/>
+          </a:p>
+        </p:txBody>
+      </p:sp>
+    </p:spTree>
+    <p:extLst>
+      <p:ext uri="{BB962C8B-B14F-4D97-AF65-F5344CB8AC3E}">
+        <p14:creationId xmlns:p14="http://schemas.microsoft.com/office/powerpoint/2010/main" val="2458953928"/>
+      </p:ext>
+    </p:extLst>
+  </p:cSld>
+  <p:clrMapOvr>
+    <a:masterClrMapping/>
+  </p:clrMapOvr>
+</p:notes>
+</file>
+
+<file path=ppt/notesSlides/notesSlide12.xml><?xml version="1.0" encoding="utf-8"?>
+<p:notes xmlns:a="http://schemas.openxmlformats.org/drawingml/2006/main" xmlns:r="http://schemas.openxmlformats.org/officeDocument/2006/relationships" xmlns:p="http://schemas.openxmlformats.org/presentationml/2006/main">
+  <p:cSld>
+    <p:spTree>
+      <p:nvGrpSpPr>
+        <p:cNvPr id="1" name=""/>
+        <p:cNvGrpSpPr/>
+        <p:nvPr/>
+      </p:nvGrpSpPr>
+      <p:grpSpPr>
+        <a:xfrm>
+          <a:off x="0" y="0"/>
+          <a:ext cx="0" cy="0"/>
+          <a:chOff x="0" y="0"/>
+          <a:chExt cx="0" cy="0"/>
+        </a:xfrm>
+      </p:grpSpPr>
+      <p:sp>
+        <p:nvSpPr>
+          <p:cNvPr id="2" name="Slide Image Placeholder 1"/>
+          <p:cNvSpPr>
+            <a:spLocks noGrp="1" noRot="1" noChangeAspect="1"/>
+          </p:cNvSpPr>
+          <p:nvPr>
+            <p:ph type="sldImg"/>
+          </p:nvPr>
+        </p:nvSpPr>
+        <p:spPr/>
+      </p:sp>
+      <p:sp>
+        <p:nvSpPr>
+          <p:cNvPr id="3" name="Notes Placeholder 2"/>
+          <p:cNvSpPr>
+            <a:spLocks noGrp="1"/>
+          </p:cNvSpPr>
+          <p:nvPr>
+            <p:ph type="body" idx="1"/>
+          </p:nvPr>
+        </p:nvSpPr>
+        <p:spPr/>
+        <p:txBody>
+          <a:bodyPr/>
+          <a:lstStyle/>
+          <a:p>
+            <a:endParaRPr lang="en-US" dirty="0"/>
+          </a:p>
+        </p:txBody>
+      </p:sp>
+      <p:sp>
+        <p:nvSpPr>
+          <p:cNvPr id="4" name="Slide Number Placeholder 3"/>
+          <p:cNvSpPr>
+            <a:spLocks noGrp="1"/>
+          </p:cNvSpPr>
+          <p:nvPr>
+            <p:ph type="sldNum" sz="quarter" idx="10"/>
+          </p:nvPr>
+        </p:nvSpPr>
+        <p:spPr/>
+        <p:txBody>
+          <a:bodyPr/>
+          <a:lstStyle/>
+          <a:p>
+            <a:fld id="{FBFDB2CD-4BE4-A34F-8525-4BCDFACD1891}" type="slidenum">
+              <a:rPr lang="en-US" smtClean="0"/>
+              <a:t>15</a:t>
+            </a:fld>
+            <a:endParaRPr lang="en-US"/>
+          </a:p>
+        </p:txBody>
+      </p:sp>
+    </p:spTree>
+    <p:extLst>
+      <p:ext uri="{BB962C8B-B14F-4D97-AF65-F5344CB8AC3E}">
+        <p14:creationId xmlns:p14="http://schemas.microsoft.com/office/powerpoint/2010/main" val="3551344217"/>
+      </p:ext>
+    </p:extLst>
+  </p:cSld>
+  <p:clrMapOvr>
+    <a:masterClrMapping/>
+  </p:clrMapOvr>
+</p:notes>
+</file>
+
+<file path=ppt/notesSlides/notesSlide13.xml><?xml version="1.0" encoding="utf-8"?>
+<p:notes xmlns:a="http://schemas.openxmlformats.org/drawingml/2006/main" xmlns:r="http://schemas.openxmlformats.org/officeDocument/2006/relationships" xmlns:p="http://schemas.openxmlformats.org/presentationml/2006/main">
+  <p:cSld>
+    <p:spTree>
+      <p:nvGrpSpPr>
+        <p:cNvPr id="1" name=""/>
+        <p:cNvGrpSpPr/>
+        <p:nvPr/>
+      </p:nvGrpSpPr>
+      <p:grpSpPr>
+        <a:xfrm>
+          <a:off x="0" y="0"/>
+          <a:ext cx="0" cy="0"/>
+          <a:chOff x="0" y="0"/>
+          <a:chExt cx="0" cy="0"/>
+        </a:xfrm>
+      </p:grpSpPr>
+      <p:sp>
+        <p:nvSpPr>
+          <p:cNvPr id="2" name="Slide Image Placeholder 1"/>
+          <p:cNvSpPr>
+            <a:spLocks noGrp="1" noRot="1" noChangeAspect="1"/>
+          </p:cNvSpPr>
+          <p:nvPr>
+            <p:ph type="sldImg"/>
+          </p:nvPr>
+        </p:nvSpPr>
+        <p:spPr/>
+      </p:sp>
+      <p:sp>
+        <p:nvSpPr>
+          <p:cNvPr id="3" name="Notes Placeholder 2"/>
+          <p:cNvSpPr>
+            <a:spLocks noGrp="1"/>
+          </p:cNvSpPr>
+          <p:nvPr>
+            <p:ph type="body" idx="1"/>
+          </p:nvPr>
+        </p:nvSpPr>
+        <p:spPr/>
+        <p:txBody>
+          <a:bodyPr/>
+          <a:lstStyle/>
+          <a:p>
+            <a:endParaRPr lang="en-US" dirty="0"/>
+          </a:p>
+        </p:txBody>
+      </p:sp>
+      <p:sp>
+        <p:nvSpPr>
+          <p:cNvPr id="4" name="Slide Number Placeholder 3"/>
+          <p:cNvSpPr>
+            <a:spLocks noGrp="1"/>
+          </p:cNvSpPr>
+          <p:nvPr>
+            <p:ph type="sldNum" sz="quarter" idx="10"/>
+          </p:nvPr>
+        </p:nvSpPr>
+        <p:spPr/>
+        <p:txBody>
+          <a:bodyPr/>
+          <a:lstStyle/>
+          <a:p>
+            <a:fld id="{FBFDB2CD-4BE4-A34F-8525-4BCDFACD1891}" type="slidenum">
+              <a:rPr lang="en-US" smtClean="0"/>
+              <a:t>16</a:t>
+            </a:fld>
+            <a:endParaRPr lang="en-US"/>
+          </a:p>
+        </p:txBody>
+      </p:sp>
+    </p:spTree>
+    <p:extLst>
+      <p:ext uri="{BB962C8B-B14F-4D97-AF65-F5344CB8AC3E}">
+        <p14:creationId xmlns:p14="http://schemas.microsoft.com/office/powerpoint/2010/main" val="2081333046"/>
       </p:ext>
     </p:extLst>
   </p:cSld>
@@ -5478,6 +5733,531 @@
     <p:extLst>
       <p:ext uri="{BB962C8B-B14F-4D97-AF65-F5344CB8AC3E}">
         <p14:creationId xmlns:p14="http://schemas.microsoft.com/office/powerpoint/2010/main" val="1158697858"/>
+      </p:ext>
+    </p:extLst>
+  </p:cSld>
+  <p:clrMapOvr>
+    <a:masterClrMapping/>
+  </p:clrMapOvr>
+</p:sld>
+</file>
+
+<file path=ppt/slides/slide14.xml><?xml version="1.0" encoding="utf-8"?>
+<p:sld xmlns:a="http://schemas.openxmlformats.org/drawingml/2006/main" xmlns:r="http://schemas.openxmlformats.org/officeDocument/2006/relationships" xmlns:p="http://schemas.openxmlformats.org/presentationml/2006/main">
+  <p:cSld>
+    <p:spTree>
+      <p:nvGrpSpPr>
+        <p:cNvPr id="1" name=""/>
+        <p:cNvGrpSpPr/>
+        <p:nvPr/>
+      </p:nvGrpSpPr>
+      <p:grpSpPr>
+        <a:xfrm>
+          <a:off x="0" y="0"/>
+          <a:ext cx="0" cy="0"/>
+          <a:chOff x="0" y="0"/>
+          <a:chExt cx="0" cy="0"/>
+        </a:xfrm>
+      </p:grpSpPr>
+      <p:sp>
+        <p:nvSpPr>
+          <p:cNvPr id="2" name="Title 1">
+            <a:extLst>
+              <a:ext uri="{FF2B5EF4-FFF2-40B4-BE49-F238E27FC236}">
+                <a16:creationId xmlns:a16="http://schemas.microsoft.com/office/drawing/2014/main" id="{F8D9D734-5D67-AF4C-AB80-99D18AFC433A}"/>
+              </a:ext>
+            </a:extLst>
+          </p:cNvPr>
+          <p:cNvSpPr>
+            <a:spLocks noGrp="1"/>
+          </p:cNvSpPr>
+          <p:nvPr>
+            <p:ph type="title"/>
+          </p:nvPr>
+        </p:nvSpPr>
+        <p:spPr/>
+        <p:txBody>
+          <a:bodyPr/>
+          <a:lstStyle/>
+          <a:p>
+            <a:r>
+              <a:rPr lang="en-US" dirty="0" err="1">
+                <a:latin typeface="Helvetica" pitchFamily="2" charset="0"/>
+                <a:ea typeface="Helvetica Neue Light" panose="02000403000000020004" pitchFamily="2" charset="0"/>
+              </a:rPr>
+              <a:t>Sycn</a:t>
+            </a:r>
+            <a:r>
+              <a:rPr lang="en-US" dirty="0">
+                <a:latin typeface="Helvetica" pitchFamily="2" charset="0"/>
+                <a:ea typeface="Helvetica Neue Light" panose="02000403000000020004" pitchFamily="2" charset="0"/>
+              </a:rPr>
+              <a:t> Provider People</a:t>
+            </a:r>
+          </a:p>
+        </p:txBody>
+      </p:sp>
+      <p:sp>
+        <p:nvSpPr>
+          <p:cNvPr id="9" name="TextBox 8">
+            <a:extLst>
+              <a:ext uri="{FF2B5EF4-FFF2-40B4-BE49-F238E27FC236}">
+                <a16:creationId xmlns:a16="http://schemas.microsoft.com/office/drawing/2014/main" id="{D53CC110-A1FB-B542-9ECB-81E8DE72DC7D}"/>
+              </a:ext>
+            </a:extLst>
+          </p:cNvPr>
+          <p:cNvSpPr txBox="1"/>
+          <p:nvPr/>
+        </p:nvSpPr>
+        <p:spPr>
+          <a:xfrm>
+            <a:off x="838200" y="1690688"/>
+            <a:ext cx="1675459" cy="523220"/>
+          </a:xfrm>
+          <a:prstGeom prst="rect">
+            <a:avLst/>
+          </a:prstGeom>
+          <a:noFill/>
+        </p:spPr>
+        <p:txBody>
+          <a:bodyPr wrap="none" rtlCol="0">
+            <a:spAutoFit/>
+          </a:bodyPr>
+          <a:lstStyle/>
+          <a:p>
+            <a:r>
+              <a:rPr lang="en-US" sz="2800" dirty="0" err="1">
+                <a:latin typeface="Helvetica Neue" panose="02000503000000020004" pitchFamily="2" charset="0"/>
+                <a:ea typeface="Helvetica Neue" panose="02000503000000020004" pitchFamily="2" charset="0"/>
+                <a:cs typeface="Helvetica Neue" panose="02000503000000020004" pitchFamily="2" charset="0"/>
+              </a:rPr>
+              <a:t>people.ts</a:t>
+            </a:r>
+            <a:endParaRPr lang="en-US" sz="2800" dirty="0">
+              <a:latin typeface="Helvetica Neue" panose="02000503000000020004" pitchFamily="2" charset="0"/>
+              <a:ea typeface="Helvetica Neue" panose="02000503000000020004" pitchFamily="2" charset="0"/>
+              <a:cs typeface="Helvetica Neue" panose="02000503000000020004" pitchFamily="2" charset="0"/>
+            </a:endParaRPr>
+          </a:p>
+        </p:txBody>
+      </p:sp>
+      <p:pic>
+        <p:nvPicPr>
+          <p:cNvPr id="5" name="Picture 4">
+            <a:extLst>
+              <a:ext uri="{FF2B5EF4-FFF2-40B4-BE49-F238E27FC236}">
+                <a16:creationId xmlns:a16="http://schemas.microsoft.com/office/drawing/2014/main" id="{8C845468-6C12-244D-8522-CD898489411B}"/>
+              </a:ext>
+            </a:extLst>
+          </p:cNvPr>
+          <p:cNvPicPr>
+            <a:picLocks noChangeAspect="1"/>
+          </p:cNvPicPr>
+          <p:nvPr/>
+        </p:nvPicPr>
+        <p:blipFill>
+          <a:blip r:embed="rId3"/>
+          <a:stretch>
+            <a:fillRect/>
+          </a:stretch>
+        </p:blipFill>
+        <p:spPr>
+          <a:xfrm>
+            <a:off x="838200" y="2270125"/>
+            <a:ext cx="7717852" cy="3359150"/>
+          </a:xfrm>
+          <a:prstGeom prst="rect">
+            <a:avLst/>
+          </a:prstGeom>
+        </p:spPr>
+      </p:pic>
+    </p:spTree>
+    <p:extLst>
+      <p:ext uri="{BB962C8B-B14F-4D97-AF65-F5344CB8AC3E}">
+        <p14:creationId xmlns:p14="http://schemas.microsoft.com/office/powerpoint/2010/main" val="3445314956"/>
+      </p:ext>
+    </p:extLst>
+  </p:cSld>
+  <p:clrMapOvr>
+    <a:masterClrMapping/>
+  </p:clrMapOvr>
+</p:sld>
+</file>
+
+<file path=ppt/slides/slide15.xml><?xml version="1.0" encoding="utf-8"?>
+<p:sld xmlns:a="http://schemas.openxmlformats.org/drawingml/2006/main" xmlns:r="http://schemas.openxmlformats.org/officeDocument/2006/relationships" xmlns:p="http://schemas.openxmlformats.org/presentationml/2006/main">
+  <p:cSld>
+    <p:spTree>
+      <p:nvGrpSpPr>
+        <p:cNvPr id="1" name=""/>
+        <p:cNvGrpSpPr/>
+        <p:nvPr/>
+      </p:nvGrpSpPr>
+      <p:grpSpPr>
+        <a:xfrm>
+          <a:off x="0" y="0"/>
+          <a:ext cx="0" cy="0"/>
+          <a:chOff x="0" y="0"/>
+          <a:chExt cx="0" cy="0"/>
+        </a:xfrm>
+      </p:grpSpPr>
+      <p:sp>
+        <p:nvSpPr>
+          <p:cNvPr id="2" name="Title 1">
+            <a:extLst>
+              <a:ext uri="{FF2B5EF4-FFF2-40B4-BE49-F238E27FC236}">
+                <a16:creationId xmlns:a16="http://schemas.microsoft.com/office/drawing/2014/main" id="{F8D9D734-5D67-AF4C-AB80-99D18AFC433A}"/>
+              </a:ext>
+            </a:extLst>
+          </p:cNvPr>
+          <p:cNvSpPr>
+            <a:spLocks noGrp="1"/>
+          </p:cNvSpPr>
+          <p:nvPr>
+            <p:ph type="title"/>
+          </p:nvPr>
+        </p:nvSpPr>
+        <p:spPr/>
+        <p:txBody>
+          <a:bodyPr/>
+          <a:lstStyle/>
+          <a:p>
+            <a:r>
+              <a:rPr lang="en-US" dirty="0" err="1">
+                <a:latin typeface="Helvetica" pitchFamily="2" charset="0"/>
+                <a:ea typeface="Helvetica Neue Light" panose="02000403000000020004" pitchFamily="2" charset="0"/>
+              </a:rPr>
+              <a:t>Sycn</a:t>
+            </a:r>
+            <a:r>
+              <a:rPr lang="en-US" dirty="0">
+                <a:latin typeface="Helvetica" pitchFamily="2" charset="0"/>
+                <a:ea typeface="Helvetica Neue Light" panose="02000403000000020004" pitchFamily="2" charset="0"/>
+              </a:rPr>
+              <a:t> Provider People</a:t>
+            </a:r>
+          </a:p>
+        </p:txBody>
+      </p:sp>
+      <p:sp>
+        <p:nvSpPr>
+          <p:cNvPr id="9" name="TextBox 8">
+            <a:extLst>
+              <a:ext uri="{FF2B5EF4-FFF2-40B4-BE49-F238E27FC236}">
+                <a16:creationId xmlns:a16="http://schemas.microsoft.com/office/drawing/2014/main" id="{D53CC110-A1FB-B542-9ECB-81E8DE72DC7D}"/>
+              </a:ext>
+            </a:extLst>
+          </p:cNvPr>
+          <p:cNvSpPr txBox="1"/>
+          <p:nvPr/>
+        </p:nvSpPr>
+        <p:spPr>
+          <a:xfrm>
+            <a:off x="838200" y="1225299"/>
+            <a:ext cx="1789272" cy="523220"/>
+          </a:xfrm>
+          <a:prstGeom prst="rect">
+            <a:avLst/>
+          </a:prstGeom>
+          <a:noFill/>
+        </p:spPr>
+        <p:txBody>
+          <a:bodyPr wrap="none" rtlCol="0">
+            <a:spAutoFit/>
+          </a:bodyPr>
+          <a:lstStyle/>
+          <a:p>
+            <a:r>
+              <a:rPr lang="en-US" sz="2800" dirty="0" err="1">
+                <a:latin typeface="Helvetica Neue" panose="02000503000000020004" pitchFamily="2" charset="0"/>
+                <a:ea typeface="Helvetica Neue" panose="02000503000000020004" pitchFamily="2" charset="0"/>
+                <a:cs typeface="Helvetica Neue" panose="02000503000000020004" pitchFamily="2" charset="0"/>
+              </a:rPr>
+              <a:t>contact.ts</a:t>
+            </a:r>
+            <a:endParaRPr lang="en-US" sz="2800" dirty="0">
+              <a:latin typeface="Helvetica Neue" panose="02000503000000020004" pitchFamily="2" charset="0"/>
+              <a:ea typeface="Helvetica Neue" panose="02000503000000020004" pitchFamily="2" charset="0"/>
+              <a:cs typeface="Helvetica Neue" panose="02000503000000020004" pitchFamily="2" charset="0"/>
+            </a:endParaRPr>
+          </a:p>
+        </p:txBody>
+      </p:sp>
+      <p:pic>
+        <p:nvPicPr>
+          <p:cNvPr id="7" name="Picture 6">
+            <a:extLst>
+              <a:ext uri="{FF2B5EF4-FFF2-40B4-BE49-F238E27FC236}">
+                <a16:creationId xmlns:a16="http://schemas.microsoft.com/office/drawing/2014/main" id="{6AAB499F-8C23-E648-9BC3-B382E6721EEB}"/>
+              </a:ext>
+            </a:extLst>
+          </p:cNvPr>
+          <p:cNvPicPr>
+            <a:picLocks noChangeAspect="1"/>
+          </p:cNvPicPr>
+          <p:nvPr/>
+        </p:nvPicPr>
+        <p:blipFill>
+          <a:blip r:embed="rId3"/>
+          <a:stretch>
+            <a:fillRect/>
+          </a:stretch>
+        </p:blipFill>
+        <p:spPr>
+          <a:xfrm>
+            <a:off x="456627" y="1951791"/>
+            <a:ext cx="6718300" cy="4495800"/>
+          </a:xfrm>
+          <a:prstGeom prst="rect">
+            <a:avLst/>
+          </a:prstGeom>
+        </p:spPr>
+      </p:pic>
+      <p:pic>
+        <p:nvPicPr>
+          <p:cNvPr id="10" name="Picture 9">
+            <a:extLst>
+              <a:ext uri="{FF2B5EF4-FFF2-40B4-BE49-F238E27FC236}">
+                <a16:creationId xmlns:a16="http://schemas.microsoft.com/office/drawing/2014/main" id="{7AD86646-1303-0D49-BFB8-2021BB02805F}"/>
+              </a:ext>
+            </a:extLst>
+          </p:cNvPr>
+          <p:cNvPicPr>
+            <a:picLocks noChangeAspect="1"/>
+          </p:cNvPicPr>
+          <p:nvPr/>
+        </p:nvPicPr>
+        <p:blipFill>
+          <a:blip r:embed="rId4"/>
+          <a:stretch>
+            <a:fillRect/>
+          </a:stretch>
+        </p:blipFill>
+        <p:spPr>
+          <a:xfrm>
+            <a:off x="7439621" y="1951791"/>
+            <a:ext cx="4578987" cy="3943683"/>
+          </a:xfrm>
+          <a:prstGeom prst="rect">
+            <a:avLst/>
+          </a:prstGeom>
+        </p:spPr>
+      </p:pic>
+      <p:sp>
+        <p:nvSpPr>
+          <p:cNvPr id="11" name="TextBox 10">
+            <a:extLst>
+              <a:ext uri="{FF2B5EF4-FFF2-40B4-BE49-F238E27FC236}">
+                <a16:creationId xmlns:a16="http://schemas.microsoft.com/office/drawing/2014/main" id="{8F553795-C137-CD47-BFFD-DFBF662E4F15}"/>
+              </a:ext>
+            </a:extLst>
+          </p:cNvPr>
+          <p:cNvSpPr txBox="1"/>
+          <p:nvPr/>
+        </p:nvSpPr>
+        <p:spPr>
+          <a:xfrm>
+            <a:off x="7439621" y="1167468"/>
+            <a:ext cx="1641796" cy="523220"/>
+          </a:xfrm>
+          <a:prstGeom prst="rect">
+            <a:avLst/>
+          </a:prstGeom>
+          <a:noFill/>
+        </p:spPr>
+        <p:txBody>
+          <a:bodyPr wrap="none" rtlCol="0">
+            <a:spAutoFit/>
+          </a:bodyPr>
+          <a:lstStyle/>
+          <a:p>
+            <a:r>
+              <a:rPr lang="en-US" sz="2800" dirty="0">
+                <a:latin typeface="Helvetica Neue" panose="02000503000000020004" pitchFamily="2" charset="0"/>
+                <a:ea typeface="Helvetica Neue" panose="02000503000000020004" pitchFamily="2" charset="0"/>
+                <a:cs typeface="Helvetica Neue" panose="02000503000000020004" pitchFamily="2" charset="0"/>
+              </a:rPr>
+              <a:t>console :</a:t>
+            </a:r>
+          </a:p>
+        </p:txBody>
+      </p:sp>
+    </p:spTree>
+    <p:extLst>
+      <p:ext uri="{BB962C8B-B14F-4D97-AF65-F5344CB8AC3E}">
+        <p14:creationId xmlns:p14="http://schemas.microsoft.com/office/powerpoint/2010/main" val="822017157"/>
+      </p:ext>
+    </p:extLst>
+  </p:cSld>
+  <p:clrMapOvr>
+    <a:masterClrMapping/>
+  </p:clrMapOvr>
+</p:sld>
+</file>
+
+<file path=ppt/slides/slide16.xml><?xml version="1.0" encoding="utf-8"?>
+<p:sld xmlns:a="http://schemas.openxmlformats.org/drawingml/2006/main" xmlns:r="http://schemas.openxmlformats.org/officeDocument/2006/relationships" xmlns:p="http://schemas.openxmlformats.org/presentationml/2006/main">
+  <p:cSld>
+    <p:spTree>
+      <p:nvGrpSpPr>
+        <p:cNvPr id="1" name=""/>
+        <p:cNvGrpSpPr/>
+        <p:nvPr/>
+      </p:nvGrpSpPr>
+      <p:grpSpPr>
+        <a:xfrm>
+          <a:off x="0" y="0"/>
+          <a:ext cx="0" cy="0"/>
+          <a:chOff x="0" y="0"/>
+          <a:chExt cx="0" cy="0"/>
+        </a:xfrm>
+      </p:grpSpPr>
+      <p:sp>
+        <p:nvSpPr>
+          <p:cNvPr id="2" name="Title 1">
+            <a:extLst>
+              <a:ext uri="{FF2B5EF4-FFF2-40B4-BE49-F238E27FC236}">
+                <a16:creationId xmlns:a16="http://schemas.microsoft.com/office/drawing/2014/main" id="{F8D9D734-5D67-AF4C-AB80-99D18AFC433A}"/>
+              </a:ext>
+            </a:extLst>
+          </p:cNvPr>
+          <p:cNvSpPr>
+            <a:spLocks noGrp="1"/>
+          </p:cNvSpPr>
+          <p:nvPr>
+            <p:ph type="title"/>
+          </p:nvPr>
+        </p:nvSpPr>
+        <p:spPr/>
+        <p:txBody>
+          <a:bodyPr/>
+          <a:lstStyle/>
+          <a:p>
+            <a:r>
+              <a:rPr lang="en-US" dirty="0" err="1">
+                <a:latin typeface="Helvetica" pitchFamily="2" charset="0"/>
+                <a:ea typeface="Helvetica Neue Light" panose="02000403000000020004" pitchFamily="2" charset="0"/>
+              </a:rPr>
+              <a:t>Sycn</a:t>
+            </a:r>
+            <a:r>
+              <a:rPr lang="en-US" dirty="0">
+                <a:latin typeface="Helvetica" pitchFamily="2" charset="0"/>
+                <a:ea typeface="Helvetica Neue Light" panose="02000403000000020004" pitchFamily="2" charset="0"/>
+              </a:rPr>
+              <a:t> Provider People</a:t>
+            </a:r>
+          </a:p>
+        </p:txBody>
+      </p:sp>
+      <p:sp>
+        <p:nvSpPr>
+          <p:cNvPr id="11" name="TextBox 10">
+            <a:extLst>
+              <a:ext uri="{FF2B5EF4-FFF2-40B4-BE49-F238E27FC236}">
+                <a16:creationId xmlns:a16="http://schemas.microsoft.com/office/drawing/2014/main" id="{8F553795-C137-CD47-BFFD-DFBF662E4F15}"/>
+              </a:ext>
+            </a:extLst>
+          </p:cNvPr>
+          <p:cNvSpPr txBox="1"/>
+          <p:nvPr/>
+        </p:nvSpPr>
+        <p:spPr>
+          <a:xfrm>
+            <a:off x="4022652" y="1690688"/>
+            <a:ext cx="1789272" cy="523220"/>
+          </a:xfrm>
+          <a:prstGeom prst="rect">
+            <a:avLst/>
+          </a:prstGeom>
+          <a:noFill/>
+        </p:spPr>
+        <p:txBody>
+          <a:bodyPr wrap="none" rtlCol="0">
+            <a:spAutoFit/>
+          </a:bodyPr>
+          <a:lstStyle/>
+          <a:p>
+            <a:r>
+              <a:rPr lang="en-US" sz="2800" dirty="0" err="1">
+                <a:latin typeface="Helvetica Neue" panose="02000503000000020004" pitchFamily="2" charset="0"/>
+                <a:ea typeface="Helvetica Neue" panose="02000503000000020004" pitchFamily="2" charset="0"/>
+                <a:cs typeface="Helvetica Neue" panose="02000503000000020004" pitchFamily="2" charset="0"/>
+              </a:rPr>
+              <a:t>contact.ts</a:t>
+            </a:r>
+            <a:endParaRPr lang="en-US" sz="2800" dirty="0">
+              <a:latin typeface="Helvetica Neue" panose="02000503000000020004" pitchFamily="2" charset="0"/>
+              <a:ea typeface="Helvetica Neue" panose="02000503000000020004" pitchFamily="2" charset="0"/>
+              <a:cs typeface="Helvetica Neue" panose="02000503000000020004" pitchFamily="2" charset="0"/>
+            </a:endParaRPr>
+          </a:p>
+        </p:txBody>
+      </p:sp>
+      <p:pic>
+        <p:nvPicPr>
+          <p:cNvPr id="4" name="Picture 3">
+            <a:extLst>
+              <a:ext uri="{FF2B5EF4-FFF2-40B4-BE49-F238E27FC236}">
+                <a16:creationId xmlns:a16="http://schemas.microsoft.com/office/drawing/2014/main" id="{0274743F-3CDA-C64B-8297-4FBC4228CFFF}"/>
+              </a:ext>
+            </a:extLst>
+          </p:cNvPr>
+          <p:cNvPicPr>
+            <a:picLocks noChangeAspect="1"/>
+          </p:cNvPicPr>
+          <p:nvPr/>
+        </p:nvPicPr>
+        <p:blipFill>
+          <a:blip r:embed="rId3"/>
+          <a:stretch>
+            <a:fillRect/>
+          </a:stretch>
+        </p:blipFill>
+        <p:spPr>
+          <a:xfrm>
+            <a:off x="838200" y="1690688"/>
+            <a:ext cx="2771274" cy="4851361"/>
+          </a:xfrm>
+          <a:prstGeom prst="rect">
+            <a:avLst/>
+          </a:prstGeom>
+        </p:spPr>
+      </p:pic>
+      <p:pic>
+        <p:nvPicPr>
+          <p:cNvPr id="6" name="Picture 5">
+            <a:extLst>
+              <a:ext uri="{FF2B5EF4-FFF2-40B4-BE49-F238E27FC236}">
+                <a16:creationId xmlns:a16="http://schemas.microsoft.com/office/drawing/2014/main" id="{485D3BCD-B480-BC4E-9F81-59097FBA16CD}"/>
+              </a:ext>
+            </a:extLst>
+          </p:cNvPr>
+          <p:cNvPicPr>
+            <a:picLocks noChangeAspect="1"/>
+          </p:cNvPicPr>
+          <p:nvPr/>
+        </p:nvPicPr>
+        <p:blipFill>
+          <a:blip r:embed="rId4"/>
+          <a:stretch>
+            <a:fillRect/>
+          </a:stretch>
+        </p:blipFill>
+        <p:spPr>
+          <a:xfrm>
+            <a:off x="4022652" y="2260234"/>
+            <a:ext cx="6541074" cy="4273349"/>
+          </a:xfrm>
+          <a:prstGeom prst="rect">
+            <a:avLst/>
+          </a:prstGeom>
+        </p:spPr>
+      </p:pic>
+    </p:spTree>
+    <p:extLst>
+      <p:ext uri="{BB962C8B-B14F-4D97-AF65-F5344CB8AC3E}">
+        <p14:creationId xmlns:p14="http://schemas.microsoft.com/office/powerpoint/2010/main" val="327743809"/>
       </p:ext>
     </p:extLst>
   </p:cSld>

</xml_diff>